<commit_message>
Change to demography slides
</commit_message>
<xml_diff>
--- a/Police shootings by demography slides.pptx
+++ b/Police shootings by demography slides.pptx
@@ -107,6 +107,11 @@
       </a:defRPr>
     </a:lvl9pPr>
   </p:defaultTextStyle>
+  <p:extLst>
+    <p:ext uri="{EFAFB233-063F-42B5-8137-9DF3F51BA10A}">
+      <p15:sldGuideLst xmlns:p15="http://schemas.microsoft.com/office/powerpoint/2012/main"/>
+    </p:ext>
+  </p:extLst>
 </p:presentation>
 </file>
 
@@ -259,7 +264,7 @@
           <a:p>
             <a:fld id="{64F4B456-2630-4FDB-A24E-7D1BDF91F85E}" type="datetimeFigureOut">
               <a:rPr lang="en-AU" smtClean="0"/>
-              <a:t>8/10/2020</a:t>
+              <a:t>9/10/2020</a:t>
             </a:fld>
             <a:endParaRPr lang="en-AU"/>
           </a:p>
@@ -459,7 +464,7 @@
           <a:p>
             <a:fld id="{64F4B456-2630-4FDB-A24E-7D1BDF91F85E}" type="datetimeFigureOut">
               <a:rPr lang="en-AU" smtClean="0"/>
-              <a:t>8/10/2020</a:t>
+              <a:t>9/10/2020</a:t>
             </a:fld>
             <a:endParaRPr lang="en-AU"/>
           </a:p>
@@ -669,7 +674,7 @@
           <a:p>
             <a:fld id="{64F4B456-2630-4FDB-A24E-7D1BDF91F85E}" type="datetimeFigureOut">
               <a:rPr lang="en-AU" smtClean="0"/>
-              <a:t>8/10/2020</a:t>
+              <a:t>9/10/2020</a:t>
             </a:fld>
             <a:endParaRPr lang="en-AU"/>
           </a:p>
@@ -869,7 +874,7 @@
           <a:p>
             <a:fld id="{64F4B456-2630-4FDB-A24E-7D1BDF91F85E}" type="datetimeFigureOut">
               <a:rPr lang="en-AU" smtClean="0"/>
-              <a:t>8/10/2020</a:t>
+              <a:t>9/10/2020</a:t>
             </a:fld>
             <a:endParaRPr lang="en-AU"/>
           </a:p>
@@ -1145,7 +1150,7 @@
           <a:p>
             <a:fld id="{64F4B456-2630-4FDB-A24E-7D1BDF91F85E}" type="datetimeFigureOut">
               <a:rPr lang="en-AU" smtClean="0"/>
-              <a:t>8/10/2020</a:t>
+              <a:t>9/10/2020</a:t>
             </a:fld>
             <a:endParaRPr lang="en-AU"/>
           </a:p>
@@ -1413,7 +1418,7 @@
           <a:p>
             <a:fld id="{64F4B456-2630-4FDB-A24E-7D1BDF91F85E}" type="datetimeFigureOut">
               <a:rPr lang="en-AU" smtClean="0"/>
-              <a:t>8/10/2020</a:t>
+              <a:t>9/10/2020</a:t>
             </a:fld>
             <a:endParaRPr lang="en-AU"/>
           </a:p>
@@ -1828,7 +1833,7 @@
           <a:p>
             <a:fld id="{64F4B456-2630-4FDB-A24E-7D1BDF91F85E}" type="datetimeFigureOut">
               <a:rPr lang="en-AU" smtClean="0"/>
-              <a:t>8/10/2020</a:t>
+              <a:t>9/10/2020</a:t>
             </a:fld>
             <a:endParaRPr lang="en-AU"/>
           </a:p>
@@ -1970,7 +1975,7 @@
           <a:p>
             <a:fld id="{64F4B456-2630-4FDB-A24E-7D1BDF91F85E}" type="datetimeFigureOut">
               <a:rPr lang="en-AU" smtClean="0"/>
-              <a:t>8/10/2020</a:t>
+              <a:t>9/10/2020</a:t>
             </a:fld>
             <a:endParaRPr lang="en-AU"/>
           </a:p>
@@ -2083,7 +2088,7 @@
           <a:p>
             <a:fld id="{64F4B456-2630-4FDB-A24E-7D1BDF91F85E}" type="datetimeFigureOut">
               <a:rPr lang="en-AU" smtClean="0"/>
-              <a:t>8/10/2020</a:t>
+              <a:t>9/10/2020</a:t>
             </a:fld>
             <a:endParaRPr lang="en-AU"/>
           </a:p>
@@ -2396,7 +2401,7 @@
           <a:p>
             <a:fld id="{64F4B456-2630-4FDB-A24E-7D1BDF91F85E}" type="datetimeFigureOut">
               <a:rPr lang="en-AU" smtClean="0"/>
-              <a:t>8/10/2020</a:t>
+              <a:t>9/10/2020</a:t>
             </a:fld>
             <a:endParaRPr lang="en-AU"/>
           </a:p>
@@ -2685,7 +2690,7 @@
           <a:p>
             <a:fld id="{64F4B456-2630-4FDB-A24E-7D1BDF91F85E}" type="datetimeFigureOut">
               <a:rPr lang="en-AU" smtClean="0"/>
-              <a:t>8/10/2020</a:t>
+              <a:t>9/10/2020</a:t>
             </a:fld>
             <a:endParaRPr lang="en-AU"/>
           </a:p>
@@ -2928,7 +2933,7 @@
           <a:p>
             <a:fld id="{64F4B456-2630-4FDB-A24E-7D1BDF91F85E}" type="datetimeFigureOut">
               <a:rPr lang="en-AU" smtClean="0"/>
-              <a:t>8/10/2020</a:t>
+              <a:t>9/10/2020</a:t>
             </a:fld>
             <a:endParaRPr lang="en-AU"/>
           </a:p>
@@ -3376,78 +3381,6 @@
           </a:p>
         </p:txBody>
       </p:sp>
-      <p:pic>
-        <p:nvPicPr>
-          <p:cNvPr id="5" name="Picture 4" descr="Chart&#10;&#10;Description automatically generated">
-            <a:extLst>
-              <a:ext uri="{FF2B5EF4-FFF2-40B4-BE49-F238E27FC236}">
-                <a16:creationId xmlns:a16="http://schemas.microsoft.com/office/drawing/2014/main" id="{2550DE54-6442-4A32-9A57-06842848942A}"/>
-              </a:ext>
-            </a:extLst>
-          </p:cNvPr>
-          <p:cNvPicPr>
-            <a:picLocks noChangeAspect="1"/>
-          </p:cNvPicPr>
-          <p:nvPr/>
-        </p:nvPicPr>
-        <p:blipFill>
-          <a:blip r:embed="rId2">
-            <a:extLst>
-              <a:ext uri="{28A0092B-C50C-407E-A947-70E740481C1C}">
-                <a14:useLocalDpi xmlns:a14="http://schemas.microsoft.com/office/drawing/2010/main" val="0"/>
-              </a:ext>
-            </a:extLst>
-          </a:blip>
-          <a:stretch>
-            <a:fillRect/>
-          </a:stretch>
-        </p:blipFill>
-        <p:spPr>
-          <a:xfrm>
-            <a:off x="838200" y="2099551"/>
-            <a:ext cx="4532385" cy="3246127"/>
-          </a:xfrm>
-          <a:prstGeom prst="rect">
-            <a:avLst/>
-          </a:prstGeom>
-        </p:spPr>
-      </p:pic>
-      <p:pic>
-        <p:nvPicPr>
-          <p:cNvPr id="7" name="Picture 6" descr="Chart, bar chart&#10;&#10;Description automatically generated">
-            <a:extLst>
-              <a:ext uri="{FF2B5EF4-FFF2-40B4-BE49-F238E27FC236}">
-                <a16:creationId xmlns:a16="http://schemas.microsoft.com/office/drawing/2014/main" id="{5E07A3DE-B1B1-4E71-B04D-3BEF1E40BEB0}"/>
-              </a:ext>
-            </a:extLst>
-          </p:cNvPr>
-          <p:cNvPicPr>
-            <a:picLocks noChangeAspect="1"/>
-          </p:cNvPicPr>
-          <p:nvPr/>
-        </p:nvPicPr>
-        <p:blipFill>
-          <a:blip r:embed="rId3">
-            <a:extLst>
-              <a:ext uri="{28A0092B-C50C-407E-A947-70E740481C1C}">
-                <a14:useLocalDpi xmlns:a14="http://schemas.microsoft.com/office/drawing/2010/main" val="0"/>
-              </a:ext>
-            </a:extLst>
-          </a:blip>
-          <a:stretch>
-            <a:fillRect/>
-          </a:stretch>
-        </p:blipFill>
-        <p:spPr>
-          <a:xfrm>
-            <a:off x="6096000" y="2099550"/>
-            <a:ext cx="4514097" cy="3246127"/>
-          </a:xfrm>
-          <a:prstGeom prst="rect">
-            <a:avLst/>
-          </a:prstGeom>
-        </p:spPr>
-      </p:pic>
       <p:sp>
         <p:nvSpPr>
           <p:cNvPr id="8" name="TextBox 7">
@@ -3503,7 +3436,7 @@
         </p:nvSpPr>
         <p:spPr>
           <a:xfrm>
-            <a:off x="6908633" y="5345676"/>
+            <a:off x="6908631" y="5337956"/>
             <a:ext cx="2888830" cy="646331"/>
           </a:xfrm>
           <a:prstGeom prst="rect">
@@ -3530,6 +3463,100 @@
           </a:p>
         </p:txBody>
       </p:sp>
+      <p:pic>
+        <p:nvPicPr>
+          <p:cNvPr id="1026" name="Picture 2">
+            <a:extLst>
+              <a:ext uri="{FF2B5EF4-FFF2-40B4-BE49-F238E27FC236}">
+                <a16:creationId xmlns:a16="http://schemas.microsoft.com/office/drawing/2014/main" id="{A9810F63-B664-4E4E-9D67-12C37EB7532F}"/>
+              </a:ext>
+            </a:extLst>
+          </p:cNvPr>
+          <p:cNvPicPr>
+            <a:picLocks noChangeAspect="1" noChangeArrowheads="1"/>
+          </p:cNvPicPr>
+          <p:nvPr/>
+        </p:nvPicPr>
+        <p:blipFill>
+          <a:blip r:embed="rId2">
+            <a:extLst>
+              <a:ext uri="{28A0092B-C50C-407E-A947-70E740481C1C}">
+                <a14:useLocalDpi xmlns:a14="http://schemas.microsoft.com/office/drawing/2010/main" val="0"/>
+              </a:ext>
+            </a:extLst>
+          </a:blip>
+          <a:srcRect/>
+          <a:stretch>
+            <a:fillRect/>
+          </a:stretch>
+        </p:blipFill>
+        <p:spPr bwMode="auto">
+          <a:xfrm>
+            <a:off x="5983659" y="2135495"/>
+            <a:ext cx="4738775" cy="3202460"/>
+          </a:xfrm>
+          <a:prstGeom prst="rect">
+            <a:avLst/>
+          </a:prstGeom>
+          <a:noFill/>
+          <a:extLst>
+            <a:ext uri="{909E8E84-426E-40DD-AFC4-6F175D3DCCD1}">
+              <a14:hiddenFill xmlns:a14="http://schemas.microsoft.com/office/drawing/2010/main">
+                <a:solidFill>
+                  <a:srgbClr val="FFFFFF"/>
+                </a:solidFill>
+              </a14:hiddenFill>
+            </a:ext>
+          </a:extLst>
+        </p:spPr>
+      </p:pic>
+      <p:pic>
+        <p:nvPicPr>
+          <p:cNvPr id="1028" name="Picture 4">
+            <a:extLst>
+              <a:ext uri="{FF2B5EF4-FFF2-40B4-BE49-F238E27FC236}">
+                <a16:creationId xmlns:a16="http://schemas.microsoft.com/office/drawing/2014/main" id="{A6762BD8-8448-49B0-99E2-A14DBF8659B8}"/>
+              </a:ext>
+            </a:extLst>
+          </p:cNvPr>
+          <p:cNvPicPr>
+            <a:picLocks noChangeAspect="1" noChangeArrowheads="1"/>
+          </p:cNvPicPr>
+          <p:nvPr/>
+        </p:nvPicPr>
+        <p:blipFill>
+          <a:blip r:embed="rId3">
+            <a:extLst>
+              <a:ext uri="{28A0092B-C50C-407E-A947-70E740481C1C}">
+                <a14:useLocalDpi xmlns:a14="http://schemas.microsoft.com/office/drawing/2010/main" val="0"/>
+              </a:ext>
+            </a:extLst>
+          </a:blip>
+          <a:srcRect/>
+          <a:stretch>
+            <a:fillRect/>
+          </a:stretch>
+        </p:blipFill>
+        <p:spPr bwMode="auto">
+          <a:xfrm>
+            <a:off x="735004" y="2135494"/>
+            <a:ext cx="4738776" cy="3202461"/>
+          </a:xfrm>
+          <a:prstGeom prst="rect">
+            <a:avLst/>
+          </a:prstGeom>
+          <a:noFill/>
+          <a:extLst>
+            <a:ext uri="{909E8E84-426E-40DD-AFC4-6F175D3DCCD1}">
+              <a14:hiddenFill xmlns:a14="http://schemas.microsoft.com/office/drawing/2010/main">
+                <a:solidFill>
+                  <a:srgbClr val="FFFFFF"/>
+                </a:solidFill>
+              </a14:hiddenFill>
+            </a:ext>
+          </a:extLst>
+        </p:spPr>
+      </p:pic>
     </p:spTree>
     <p:extLst>
       <p:ext uri="{BB962C8B-B14F-4D97-AF65-F5344CB8AC3E}">

</xml_diff>

<commit_message>
Changes to demography slides
</commit_message>
<xml_diff>
--- a/Police shootings by demography slides.pptx
+++ b/Police shootings by demography slides.pptx
@@ -3492,7 +3492,7 @@
         </p:blipFill>
         <p:spPr bwMode="auto">
           <a:xfrm>
-            <a:off x="5983659" y="2135495"/>
+            <a:off x="735004" y="2135495"/>
             <a:ext cx="4738775" cy="3202460"/>
           </a:xfrm>
           <a:prstGeom prst="rect">
@@ -3539,7 +3539,7 @@
         </p:blipFill>
         <p:spPr bwMode="auto">
           <a:xfrm>
-            <a:off x="735004" y="2135494"/>
+            <a:off x="5983658" y="2135495"/>
             <a:ext cx="4738776" cy="3202461"/>
           </a:xfrm>
           <a:prstGeom prst="rect">

</xml_diff>